<commit_message>
TATs ugly designs improved.
</commit_message>
<xml_diff>
--- a/PPTX/LU Exam Hive-TAT.pptx
+++ b/PPTX/LU Exam Hive-TAT.pptx
@@ -248,7 +248,7 @@
           <a:p>
             <a:fld id="{54C5C494-359E-4322-A908-1D6B911C7A04}" type="datetimeFigureOut">
               <a:rPr lang="en-US" smtClean="0"/>
-              <a:t>17-Mar-21</a:t>
+              <a:t>18-Mar-21</a:t>
             </a:fld>
             <a:endParaRPr lang="en-US"/>
           </a:p>
@@ -418,7 +418,7 @@
           <a:p>
             <a:fld id="{54C5C494-359E-4322-A908-1D6B911C7A04}" type="datetimeFigureOut">
               <a:rPr lang="en-US" smtClean="0"/>
-              <a:t>17-Mar-21</a:t>
+              <a:t>18-Mar-21</a:t>
             </a:fld>
             <a:endParaRPr lang="en-US"/>
           </a:p>
@@ -598,7 +598,7 @@
           <a:p>
             <a:fld id="{54C5C494-359E-4322-A908-1D6B911C7A04}" type="datetimeFigureOut">
               <a:rPr lang="en-US" smtClean="0"/>
-              <a:t>17-Mar-21</a:t>
+              <a:t>18-Mar-21</a:t>
             </a:fld>
             <a:endParaRPr lang="en-US"/>
           </a:p>
@@ -768,7 +768,7 @@
           <a:p>
             <a:fld id="{54C5C494-359E-4322-A908-1D6B911C7A04}" type="datetimeFigureOut">
               <a:rPr lang="en-US" smtClean="0"/>
-              <a:t>17-Mar-21</a:t>
+              <a:t>18-Mar-21</a:t>
             </a:fld>
             <a:endParaRPr lang="en-US"/>
           </a:p>
@@ -1014,7 +1014,7 @@
           <a:p>
             <a:fld id="{54C5C494-359E-4322-A908-1D6B911C7A04}" type="datetimeFigureOut">
               <a:rPr lang="en-US" smtClean="0"/>
-              <a:t>17-Mar-21</a:t>
+              <a:t>18-Mar-21</a:t>
             </a:fld>
             <a:endParaRPr lang="en-US"/>
           </a:p>
@@ -1246,7 +1246,7 @@
           <a:p>
             <a:fld id="{54C5C494-359E-4322-A908-1D6B911C7A04}" type="datetimeFigureOut">
               <a:rPr lang="en-US" smtClean="0"/>
-              <a:t>17-Mar-21</a:t>
+              <a:t>18-Mar-21</a:t>
             </a:fld>
             <a:endParaRPr lang="en-US"/>
           </a:p>
@@ -1613,7 +1613,7 @@
           <a:p>
             <a:fld id="{54C5C494-359E-4322-A908-1D6B911C7A04}" type="datetimeFigureOut">
               <a:rPr lang="en-US" smtClean="0"/>
-              <a:t>17-Mar-21</a:t>
+              <a:t>18-Mar-21</a:t>
             </a:fld>
             <a:endParaRPr lang="en-US"/>
           </a:p>
@@ -1731,7 +1731,7 @@
           <a:p>
             <a:fld id="{54C5C494-359E-4322-A908-1D6B911C7A04}" type="datetimeFigureOut">
               <a:rPr lang="en-US" smtClean="0"/>
-              <a:t>17-Mar-21</a:t>
+              <a:t>18-Mar-21</a:t>
             </a:fld>
             <a:endParaRPr lang="en-US"/>
           </a:p>
@@ -1826,7 +1826,7 @@
           <a:p>
             <a:fld id="{54C5C494-359E-4322-A908-1D6B911C7A04}" type="datetimeFigureOut">
               <a:rPr lang="en-US" smtClean="0"/>
-              <a:t>17-Mar-21</a:t>
+              <a:t>18-Mar-21</a:t>
             </a:fld>
             <a:endParaRPr lang="en-US"/>
           </a:p>
@@ -2103,7 +2103,7 @@
           <a:p>
             <a:fld id="{54C5C494-359E-4322-A908-1D6B911C7A04}" type="datetimeFigureOut">
               <a:rPr lang="en-US" smtClean="0"/>
-              <a:t>17-Mar-21</a:t>
+              <a:t>18-Mar-21</a:t>
             </a:fld>
             <a:endParaRPr lang="en-US"/>
           </a:p>
@@ -2356,7 +2356,7 @@
           <a:p>
             <a:fld id="{54C5C494-359E-4322-A908-1D6B911C7A04}" type="datetimeFigureOut">
               <a:rPr lang="en-US" smtClean="0"/>
-              <a:t>17-Mar-21</a:t>
+              <a:t>18-Mar-21</a:t>
             </a:fld>
             <a:endParaRPr lang="en-US"/>
           </a:p>
@@ -2569,7 +2569,7 @@
           <a:p>
             <a:fld id="{54C5C494-359E-4322-A908-1D6B911C7A04}" type="datetimeFigureOut">
               <a:rPr lang="en-US" smtClean="0"/>
-              <a:t>17-Mar-21</a:t>
+              <a:t>18-Mar-21</a:t>
             </a:fld>
             <a:endParaRPr lang="en-US"/>
           </a:p>
@@ -2960,6 +2960,16 @@
 <file path=ppt/slides/slide1.xml><?xml version="1.0" encoding="utf-8"?>
 <p:sld xmlns:a="http://schemas.openxmlformats.org/drawingml/2006/main" xmlns:r="http://schemas.openxmlformats.org/officeDocument/2006/relationships" xmlns:p="http://schemas.openxmlformats.org/presentationml/2006/main">
   <p:cSld>
+    <p:bg>
+      <p:bgPr>
+        <a:solidFill>
+          <a:schemeClr val="bg1">
+            <a:lumMod val="95000"/>
+          </a:schemeClr>
+        </a:solidFill>
+        <a:effectLst/>
+      </p:bgPr>
+    </p:bg>
     <p:spTree>
       <p:nvGrpSpPr>
         <p:cNvPr id="1" name=""/>
@@ -2986,8 +2996,8 @@
         </p:nvSpPr>
         <p:spPr>
           <a:xfrm>
-            <a:off x="5368360" y="1350371"/>
-            <a:ext cx="5891823" cy="2963772"/>
+            <a:off x="1475235" y="1134753"/>
+            <a:ext cx="3567820" cy="1408769"/>
           </a:xfrm>
         </p:spPr>
         <p:txBody>
@@ -2996,61 +3006,95 @@
           </a:bodyPr>
           <a:lstStyle/>
           <a:p>
-            <a:r>
-              <a:rPr lang="en-US" sz="3200" dirty="0" smtClean="0"/>
-              <a:t>FPDF is a PHP class</a:t>
-            </a:r>
-            <a:br>
-              <a:rPr lang="en-US" sz="3200" dirty="0" smtClean="0"/>
-            </a:br>
-            <a:r>
-              <a:rPr lang="en-US" sz="3200" dirty="0" smtClean="0"/>
-              <a:t/>
-            </a:r>
-            <a:br>
-              <a:rPr lang="en-US" sz="3200" dirty="0" smtClean="0"/>
-            </a:br>
-            <a:r>
-              <a:rPr lang="en-US" sz="3200" dirty="0" smtClean="0"/>
-              <a:t>Generate Result</a:t>
-            </a:r>
-            <a:endParaRPr lang="en-US" sz="3200" dirty="0"/>
-          </a:p>
-        </p:txBody>
-      </p:sp>
-      <p:sp>
-        <p:nvSpPr>
-          <p:cNvPr id="3" name="Subtitle 2"/>
-          <p:cNvSpPr>
-            <a:spLocks noGrp="1"/>
-          </p:cNvSpPr>
-          <p:nvPr>
-            <p:ph type="subTitle" idx="1"/>
-          </p:nvPr>
-        </p:nvSpPr>
-        <p:spPr>
-          <a:xfrm>
-            <a:off x="1523999" y="4101737"/>
-            <a:ext cx="5556070" cy="1436913"/>
-          </a:xfrm>
-        </p:spPr>
-        <p:txBody>
-          <a:bodyPr/>
-          <a:lstStyle/>
-          <a:p>
-            <a:endParaRPr lang="en-US" dirty="0" smtClean="0"/>
-          </a:p>
-          <a:p>
-            <a:endParaRPr lang="en-US" dirty="0"/>
-          </a:p>
-          <a:p>
-            <a:endParaRPr lang="en-US" dirty="0" smtClean="0"/>
-          </a:p>
-          <a:p>
-            <a:endParaRPr lang="en-US" dirty="0"/>
-          </a:p>
-          <a:p>
-            <a:endParaRPr lang="en-US" dirty="0"/>
+            <a:pPr algn="just"/>
+            <a:r>
+              <a:rPr lang="en-US" sz="2000" dirty="0">
+                <a:solidFill>
+                  <a:schemeClr val="accent1">
+                    <a:lumMod val="75000"/>
+                  </a:schemeClr>
+                </a:solidFill>
+                <a:latin typeface="Times New Roman" panose="02020603050405020304" pitchFamily="18" charset="0"/>
+                <a:cs typeface="Times New Roman" panose="02020603050405020304" pitchFamily="18" charset="0"/>
+              </a:rPr>
+              <a:t>FPDF</a:t>
+            </a:r>
+            <a:r>
+              <a:rPr lang="en-US" sz="2000" dirty="0">
+                <a:latin typeface="Times New Roman" panose="02020603050405020304" pitchFamily="18" charset="0"/>
+                <a:cs typeface="Times New Roman" panose="02020603050405020304" pitchFamily="18" charset="0"/>
+              </a:rPr>
+              <a:t> is a PHP class which allows to </a:t>
+            </a:r>
+            <a:r>
+              <a:rPr lang="en-US" sz="2000" dirty="0">
+                <a:solidFill>
+                  <a:srgbClr val="FF0000"/>
+                </a:solidFill>
+                <a:latin typeface="Times New Roman" panose="02020603050405020304" pitchFamily="18" charset="0"/>
+                <a:cs typeface="Times New Roman" panose="02020603050405020304" pitchFamily="18" charset="0"/>
+              </a:rPr>
+              <a:t>generate PDF </a:t>
+            </a:r>
+            <a:r>
+              <a:rPr lang="en-US" sz="2000" dirty="0">
+                <a:latin typeface="Times New Roman" panose="02020603050405020304" pitchFamily="18" charset="0"/>
+                <a:cs typeface="Times New Roman" panose="02020603050405020304" pitchFamily="18" charset="0"/>
+              </a:rPr>
+              <a:t>files with pure PHP, that is to say without using the </a:t>
+            </a:r>
+            <a:r>
+              <a:rPr lang="en-US" sz="2000" dirty="0">
+                <a:solidFill>
+                  <a:schemeClr val="accent1">
+                    <a:lumMod val="75000"/>
+                  </a:schemeClr>
+                </a:solidFill>
+                <a:latin typeface="Times New Roman" panose="02020603050405020304" pitchFamily="18" charset="0"/>
+                <a:cs typeface="Times New Roman" panose="02020603050405020304" pitchFamily="18" charset="0"/>
+              </a:rPr>
+              <a:t>PDFlib </a:t>
+            </a:r>
+            <a:r>
+              <a:rPr lang="en-US" sz="2000" dirty="0" smtClean="0">
+                <a:solidFill>
+                  <a:schemeClr val="accent1">
+                    <a:lumMod val="75000"/>
+                  </a:schemeClr>
+                </a:solidFill>
+                <a:latin typeface="Times New Roman" panose="02020603050405020304" pitchFamily="18" charset="0"/>
+                <a:cs typeface="Times New Roman" panose="02020603050405020304" pitchFamily="18" charset="0"/>
+              </a:rPr>
+              <a:t>library</a:t>
+            </a:r>
+            <a:r>
+              <a:rPr lang="en-US" sz="2000" dirty="0" smtClean="0">
+                <a:latin typeface="Times New Roman" panose="02020603050405020304" pitchFamily="18" charset="0"/>
+                <a:cs typeface="Times New Roman" panose="02020603050405020304" pitchFamily="18" charset="0"/>
+              </a:rPr>
+              <a:t>.</a:t>
+            </a:r>
+            <a:r>
+              <a:rPr lang="en-US" sz="2000" dirty="0" smtClean="0">
+                <a:solidFill>
+                  <a:schemeClr val="accent1">
+                    <a:lumMod val="75000"/>
+                  </a:schemeClr>
+                </a:solidFill>
+                <a:latin typeface="Times New Roman" panose="02020603050405020304" pitchFamily="18" charset="0"/>
+                <a:cs typeface="Times New Roman" panose="02020603050405020304" pitchFamily="18" charset="0"/>
+              </a:rPr>
+              <a:t> </a:t>
+            </a:r>
+            <a:endParaRPr lang="en-US" sz="2000" dirty="0">
+              <a:solidFill>
+                <a:schemeClr val="accent1">
+                  <a:lumMod val="75000"/>
+                </a:schemeClr>
+              </a:solidFill>
+              <a:latin typeface="Times New Roman" panose="02020603050405020304" pitchFamily="18" charset="0"/>
+              <a:cs typeface="Times New Roman" panose="02020603050405020304" pitchFamily="18" charset="0"/>
+            </a:endParaRPr>
           </a:p>
         </p:txBody>
       </p:sp>
@@ -3076,8 +3120,8 @@
         </p:blipFill>
         <p:spPr>
           <a:xfrm>
-            <a:off x="1762533" y="906234"/>
-            <a:ext cx="3215640" cy="2411730"/>
+            <a:off x="7269208" y="3989106"/>
+            <a:ext cx="3800574" cy="1968664"/>
           </a:xfrm>
           <a:prstGeom prst="rect">
             <a:avLst/>
@@ -3106,14 +3150,286 @@
         </p:blipFill>
         <p:spPr>
           <a:xfrm>
-            <a:off x="1199606" y="4314143"/>
-            <a:ext cx="3990975" cy="1038225"/>
+            <a:off x="7269208" y="1134753"/>
+            <a:ext cx="3800574" cy="1632312"/>
           </a:xfrm>
           <a:prstGeom prst="rect">
             <a:avLst/>
           </a:prstGeom>
         </p:spPr>
       </p:pic>
+      <p:sp>
+        <p:nvSpPr>
+          <p:cNvPr id="7" name="Rectangle 6"/>
+          <p:cNvSpPr/>
+          <p:nvPr/>
+        </p:nvSpPr>
+        <p:spPr>
+          <a:xfrm>
+            <a:off x="4532814" y="359541"/>
+            <a:ext cx="2966774" cy="630942"/>
+          </a:xfrm>
+          <a:prstGeom prst="rect">
+            <a:avLst/>
+          </a:prstGeom>
+        </p:spPr>
+        <p:txBody>
+          <a:bodyPr wrap="none">
+            <a:spAutoFit/>
+          </a:bodyPr>
+          <a:lstStyle/>
+          <a:p>
+            <a:r>
+              <a:rPr lang="en-US" sz="3500" b="1" dirty="0" smtClean="0">
+                <a:latin typeface="Microsoft Himalaya" panose="01010100010101010101" pitchFamily="2" charset="0"/>
+                <a:ea typeface="Microsoft Himalaya" panose="01010100010101010101" pitchFamily="2" charset="0"/>
+                <a:cs typeface="Microsoft Himalaya" panose="01010100010101010101" pitchFamily="2" charset="0"/>
+              </a:rPr>
+              <a:t>How We Generate PDF</a:t>
+            </a:r>
+            <a:endParaRPr lang="en-US" sz="3500" b="1" dirty="0">
+              <a:latin typeface="Microsoft Himalaya" panose="01010100010101010101" pitchFamily="2" charset="0"/>
+              <a:ea typeface="Microsoft Himalaya" panose="01010100010101010101" pitchFamily="2" charset="0"/>
+              <a:cs typeface="Microsoft Himalaya" panose="01010100010101010101" pitchFamily="2" charset="0"/>
+            </a:endParaRPr>
+          </a:p>
+        </p:txBody>
+      </p:sp>
+      <p:sp>
+        <p:nvSpPr>
+          <p:cNvPr id="8" name="Rectangle 7"/>
+          <p:cNvSpPr/>
+          <p:nvPr/>
+        </p:nvSpPr>
+        <p:spPr>
+          <a:xfrm>
+            <a:off x="321981" y="3542277"/>
+            <a:ext cx="6096000" cy="2862322"/>
+          </a:xfrm>
+          <a:prstGeom prst="rect">
+            <a:avLst/>
+          </a:prstGeom>
+        </p:spPr>
+        <p:txBody>
+          <a:bodyPr>
+            <a:spAutoFit/>
+          </a:bodyPr>
+          <a:lstStyle/>
+          <a:p>
+            <a:pPr algn="ctr"/>
+            <a:r>
+              <a:rPr lang="en-US" u="sng" dirty="0" smtClean="0">
+                <a:solidFill>
+                  <a:srgbClr val="000000"/>
+                </a:solidFill>
+                <a:latin typeface="Times New Roman" panose="02020603050405020304" pitchFamily="18" charset="0"/>
+              </a:rPr>
+              <a:t>Main features</a:t>
+            </a:r>
+            <a:endParaRPr lang="en-US" u="sng" dirty="0">
+              <a:solidFill>
+                <a:srgbClr val="000000"/>
+              </a:solidFill>
+              <a:latin typeface="Times New Roman" panose="02020603050405020304" pitchFamily="18" charset="0"/>
+            </a:endParaRPr>
+          </a:p>
+          <a:p>
+            <a:pPr algn="ctr">
+              <a:lnSpc>
+                <a:spcPct val="150000"/>
+              </a:lnSpc>
+              <a:buFont typeface="Arial" panose="020B0604020202020204" pitchFamily="34" charset="0"/>
+              <a:buChar char="•"/>
+            </a:pPr>
+            <a:r>
+              <a:rPr lang="en-US" dirty="0" smtClean="0">
+                <a:solidFill>
+                  <a:srgbClr val="000000"/>
+                </a:solidFill>
+                <a:latin typeface="Times New Roman" panose="02020603050405020304" pitchFamily="18" charset="0"/>
+              </a:rPr>
+              <a:t> Choice </a:t>
+            </a:r>
+            <a:r>
+              <a:rPr lang="en-US" dirty="0">
+                <a:solidFill>
+                  <a:srgbClr val="000000"/>
+                </a:solidFill>
+                <a:latin typeface="Times New Roman" panose="02020603050405020304" pitchFamily="18" charset="0"/>
+              </a:rPr>
+              <a:t>of measure unit, page format </a:t>
+            </a:r>
+            <a:r>
+              <a:rPr lang="en-US" dirty="0" smtClean="0">
+                <a:solidFill>
+                  <a:srgbClr val="000000"/>
+                </a:solidFill>
+                <a:latin typeface="Times New Roman" panose="02020603050405020304" pitchFamily="18" charset="0"/>
+              </a:rPr>
+              <a:t>and </a:t>
+            </a:r>
+            <a:r>
+              <a:rPr lang="en-US" dirty="0">
+                <a:solidFill>
+                  <a:srgbClr val="000000"/>
+                </a:solidFill>
+                <a:latin typeface="Times New Roman" panose="02020603050405020304" pitchFamily="18" charset="0"/>
+              </a:rPr>
+              <a:t>margins</a:t>
+            </a:r>
+          </a:p>
+          <a:p>
+            <a:pPr algn="ctr">
+              <a:lnSpc>
+                <a:spcPct val="150000"/>
+              </a:lnSpc>
+              <a:buFont typeface="Arial" panose="020B0604020202020204" pitchFamily="34" charset="0"/>
+              <a:buChar char="•"/>
+            </a:pPr>
+            <a:r>
+              <a:rPr lang="en-US" dirty="0" smtClean="0">
+                <a:solidFill>
+                  <a:srgbClr val="000000"/>
+                </a:solidFill>
+                <a:latin typeface="Times New Roman" panose="02020603050405020304" pitchFamily="18" charset="0"/>
+              </a:rPr>
+              <a:t> Automatic </a:t>
+            </a:r>
+            <a:r>
+              <a:rPr lang="en-US" dirty="0">
+                <a:solidFill>
+                  <a:srgbClr val="000000"/>
+                </a:solidFill>
+                <a:latin typeface="Times New Roman" panose="02020603050405020304" pitchFamily="18" charset="0"/>
+              </a:rPr>
+              <a:t>line break and text </a:t>
+            </a:r>
+            <a:r>
+              <a:rPr lang="en-US" dirty="0" smtClean="0">
+                <a:solidFill>
+                  <a:srgbClr val="000000"/>
+                </a:solidFill>
+                <a:latin typeface="Times New Roman" panose="02020603050405020304" pitchFamily="18" charset="0"/>
+              </a:rPr>
+              <a:t>justification</a:t>
+            </a:r>
+            <a:endParaRPr lang="en-US" dirty="0">
+              <a:solidFill>
+                <a:srgbClr val="000000"/>
+              </a:solidFill>
+              <a:latin typeface="Times New Roman" panose="02020603050405020304" pitchFamily="18" charset="0"/>
+            </a:endParaRPr>
+          </a:p>
+          <a:p>
+            <a:pPr algn="ctr">
+              <a:lnSpc>
+                <a:spcPct val="150000"/>
+              </a:lnSpc>
+              <a:buFont typeface="Arial" panose="020B0604020202020204" pitchFamily="34" charset="0"/>
+              <a:buChar char="•"/>
+            </a:pPr>
+            <a:r>
+              <a:rPr lang="en-US" dirty="0" smtClean="0">
+                <a:solidFill>
+                  <a:srgbClr val="000000"/>
+                </a:solidFill>
+                <a:latin typeface="Times New Roman" panose="02020603050405020304" pitchFamily="18" charset="0"/>
+              </a:rPr>
+              <a:t> Image </a:t>
+            </a:r>
+            <a:r>
+              <a:rPr lang="en-US" dirty="0">
+                <a:solidFill>
+                  <a:srgbClr val="000000"/>
+                </a:solidFill>
+                <a:latin typeface="Times New Roman" panose="02020603050405020304" pitchFamily="18" charset="0"/>
+              </a:rPr>
+              <a:t>support (JPEG, PNG and GIF)</a:t>
+            </a:r>
+          </a:p>
+          <a:p>
+            <a:pPr algn="ctr">
+              <a:lnSpc>
+                <a:spcPct val="150000"/>
+              </a:lnSpc>
+              <a:buFont typeface="Arial" panose="020B0604020202020204" pitchFamily="34" charset="0"/>
+              <a:buChar char="•"/>
+            </a:pPr>
+            <a:r>
+              <a:rPr lang="en-US" dirty="0" smtClean="0">
+                <a:solidFill>
+                  <a:srgbClr val="000000"/>
+                </a:solidFill>
+                <a:latin typeface="Times New Roman" panose="02020603050405020304" pitchFamily="18" charset="0"/>
+              </a:rPr>
+              <a:t> Colors</a:t>
+            </a:r>
+            <a:endParaRPr lang="en-US" dirty="0">
+              <a:solidFill>
+                <a:srgbClr val="000000"/>
+              </a:solidFill>
+              <a:latin typeface="Times New Roman" panose="02020603050405020304" pitchFamily="18" charset="0"/>
+            </a:endParaRPr>
+          </a:p>
+          <a:p>
+            <a:pPr algn="ctr">
+              <a:lnSpc>
+                <a:spcPct val="150000"/>
+              </a:lnSpc>
+              <a:buFont typeface="Arial" panose="020B0604020202020204" pitchFamily="34" charset="0"/>
+              <a:buChar char="•"/>
+            </a:pPr>
+            <a:r>
+              <a:rPr lang="en-US" dirty="0" smtClean="0">
+                <a:solidFill>
+                  <a:srgbClr val="000000"/>
+                </a:solidFill>
+                <a:latin typeface="Times New Roman" panose="02020603050405020304" pitchFamily="18" charset="0"/>
+              </a:rPr>
+              <a:t> Links</a:t>
+            </a:r>
+            <a:endParaRPr lang="en-US" dirty="0">
+              <a:solidFill>
+                <a:srgbClr val="000000"/>
+              </a:solidFill>
+              <a:latin typeface="Times New Roman" panose="02020603050405020304" pitchFamily="18" charset="0"/>
+            </a:endParaRPr>
+          </a:p>
+          <a:p>
+            <a:pPr algn="ctr">
+              <a:lnSpc>
+                <a:spcPct val="150000"/>
+              </a:lnSpc>
+              <a:buFont typeface="Arial" panose="020B0604020202020204" pitchFamily="34" charset="0"/>
+              <a:buChar char="•"/>
+            </a:pPr>
+            <a:r>
+              <a:rPr lang="en-US" dirty="0" smtClean="0">
+                <a:solidFill>
+                  <a:srgbClr val="000000"/>
+                </a:solidFill>
+                <a:latin typeface="Times New Roman" panose="02020603050405020304" pitchFamily="18" charset="0"/>
+              </a:rPr>
+              <a:t> Page </a:t>
+            </a:r>
+            <a:r>
+              <a:rPr lang="en-US" dirty="0">
+                <a:solidFill>
+                  <a:srgbClr val="000000"/>
+                </a:solidFill>
+                <a:latin typeface="Times New Roman" panose="02020603050405020304" pitchFamily="18" charset="0"/>
+              </a:rPr>
+              <a:t>compression</a:t>
+            </a:r>
+            <a:endParaRPr lang="en-US" b="0" i="0" dirty="0">
+              <a:solidFill>
+                <a:srgbClr val="000000"/>
+              </a:solidFill>
+              <a:latin typeface="Times New Roman" panose="02020603050405020304" pitchFamily="18" charset="0"/>
+            </a:endParaRPr>
+          </a:p>
+        </p:txBody>
+      </p:sp>
     </p:spTree>
     <p:extLst>
       <p:ext uri="{BB962C8B-B14F-4D97-AF65-F5344CB8AC3E}">
@@ -3124,12 +3440,29 @@
   <p:clrMapOvr>
     <a:masterClrMapping/>
   </p:clrMapOvr>
+  <p:timing>
+    <p:tnLst>
+      <p:par>
+        <p:cTn id="1" dur="indefinite" restart="never" nodeType="tmRoot"/>
+      </p:par>
+    </p:tnLst>
+  </p:timing>
 </p:sld>
 </file>
 
 <file path=ppt/slides/slide2.xml><?xml version="1.0" encoding="utf-8"?>
 <p:sld xmlns:a="http://schemas.openxmlformats.org/drawingml/2006/main" xmlns:r="http://schemas.openxmlformats.org/officeDocument/2006/relationships" xmlns:p="http://schemas.openxmlformats.org/presentationml/2006/main">
   <p:cSld>
+    <p:bg>
+      <p:bgPr>
+        <a:solidFill>
+          <a:schemeClr val="bg1">
+            <a:lumMod val="95000"/>
+          </a:schemeClr>
+        </a:solidFill>
+        <a:effectLst/>
+      </p:bgPr>
+    </p:bg>
     <p:spTree>
       <p:nvGrpSpPr>
         <p:cNvPr id="1" name=""/>
@@ -3156,50 +3489,41 @@
         </p:nvSpPr>
         <p:spPr>
           <a:xfrm>
-            <a:off x="6100354" y="365125"/>
-            <a:ext cx="5253445" cy="4376692"/>
+            <a:off x="172585" y="5780923"/>
+            <a:ext cx="5015943" cy="588587"/>
           </a:xfrm>
         </p:spPr>
         <p:txBody>
           <a:bodyPr>
-            <a:normAutofit/>
+            <a:normAutofit fontScale="90000"/>
           </a:bodyPr>
           <a:lstStyle/>
           <a:p>
-            <a:pPr algn="ctr"/>
-            <a:r>
-              <a:rPr lang="en-US" sz="2800" dirty="0" smtClean="0"/>
-              <a:t>Bootstrap Framework HTML &amp; CSS</a:t>
+            <a:pPr algn="ctr">
+              <a:lnSpc>
+                <a:spcPct val="150000"/>
+              </a:lnSpc>
+            </a:pPr>
+            <a:r>
+              <a:rPr lang="en-US" sz="2000" i="1" dirty="0" smtClean="0"/>
+              <a:t>Bootstrap Framework HTML &amp; </a:t>
+            </a:r>
+            <a:r>
+              <a:rPr lang="en-US" sz="2000" i="1" dirty="0" smtClean="0"/>
+              <a:t>CSS Templates</a:t>
+            </a:r>
+            <a:r>
+              <a:rPr lang="en-US" sz="2000" i="1" dirty="0" smtClean="0"/>
+              <a:t/>
             </a:r>
             <a:br>
-              <a:rPr lang="en-US" sz="2800" dirty="0" smtClean="0"/>
+              <a:rPr lang="en-US" sz="2000" i="1" dirty="0" smtClean="0"/>
             </a:br>
             <a:r>
-              <a:rPr lang="en-US" sz="2800" dirty="0" smtClean="0"/>
-              <a:t/>
-            </a:r>
-            <a:br>
-              <a:rPr lang="en-US" sz="2800" dirty="0" smtClean="0"/>
-            </a:br>
-            <a:r>
-              <a:rPr lang="en-US" sz="2800" dirty="0" smtClean="0"/>
-              <a:t>Templates</a:t>
-            </a:r>
-            <a:br>
-              <a:rPr lang="en-US" sz="2800" dirty="0" smtClean="0"/>
-            </a:br>
-            <a:r>
-              <a:rPr lang="en-US" sz="2800" dirty="0" smtClean="0"/>
-              <a:t/>
-            </a:r>
-            <a:br>
-              <a:rPr lang="en-US" sz="2800" dirty="0" smtClean="0"/>
-            </a:br>
-            <a:r>
-              <a:rPr lang="en-US" sz="2800" dirty="0" smtClean="0"/>
+              <a:rPr lang="en-US" sz="2000" i="1" dirty="0" smtClean="0"/>
               <a:t>Responsive Website</a:t>
             </a:r>
-            <a:endParaRPr lang="en-US" sz="2800" dirty="0"/>
+            <a:endParaRPr lang="en-US" sz="2000" i="1" dirty="0"/>
           </a:p>
         </p:txBody>
       </p:sp>
@@ -3214,7 +3538,7 @@
           </p:nvPr>
         </p:nvPicPr>
         <p:blipFill>
-          <a:blip r:embed="rId2">
+          <a:blip r:embed="rId2" cstate="print">
             <a:extLst>
               <a:ext uri="{28A0092B-C50C-407E-A947-70E740481C1C}">
                 <a14:useLocalDpi xmlns:a14="http://schemas.microsoft.com/office/drawing/2010/main" val="0"/>
@@ -3227,8 +3551,8 @@
         </p:blipFill>
         <p:spPr>
           <a:xfrm>
-            <a:off x="1251449" y="365125"/>
-            <a:ext cx="4276725" cy="3495675"/>
+            <a:off x="961349" y="991228"/>
+            <a:ext cx="3264287" cy="1945936"/>
           </a:xfrm>
         </p:spPr>
       </p:pic>
@@ -3243,7 +3567,7 @@
           </p:nvPr>
         </p:nvPicPr>
         <p:blipFill>
-          <a:blip r:embed="rId3">
+          <a:blip r:embed="rId3" cstate="print">
             <a:extLst>
               <a:ext uri="{28A0092B-C50C-407E-A947-70E740481C1C}">
                 <a14:useLocalDpi xmlns:a14="http://schemas.microsoft.com/office/drawing/2010/main" val="0"/>
@@ -3256,8 +3580,8 @@
         </p:blipFill>
         <p:spPr>
           <a:xfrm>
-            <a:off x="7017883" y="5079524"/>
-            <a:ext cx="4143375" cy="952500"/>
+            <a:off x="7167865" y="991227"/>
+            <a:ext cx="3202684" cy="830623"/>
           </a:xfrm>
         </p:spPr>
       </p:pic>
@@ -3271,8 +3595,8 @@
         </p:nvSpPr>
         <p:spPr>
           <a:xfrm>
-            <a:off x="1053738" y="3886449"/>
-            <a:ext cx="4236719" cy="2386149"/>
+            <a:off x="7167865" y="5718867"/>
+            <a:ext cx="3437368" cy="464127"/>
           </a:xfrm>
           <a:prstGeom prst="rect">
             <a:avLst/>
@@ -3280,7 +3604,7 @@
         </p:spPr>
         <p:txBody>
           <a:bodyPr vert="horz" lIns="91440" tIns="45720" rIns="91440" bIns="45720" rtlCol="0" anchor="ctr">
-            <a:normAutofit/>
+            <a:normAutofit fontScale="92500" lnSpcReduction="10000"/>
           </a:bodyPr>
           <a:lstStyle>
             <a:lvl1pPr algn="l" defTabSz="914400" rtl="0" eaLnBrk="1" latinLnBrk="0" hangingPunct="1">
@@ -3302,26 +3626,156 @@
             </a:lvl1pPr>
           </a:lstStyle>
           <a:p>
-            <a:pPr algn="ctr"/>
-            <a:r>
-              <a:rPr lang="en-US" sz="2800" dirty="0" smtClean="0"/>
+            <a:pPr algn="ctr">
+              <a:lnSpc>
+                <a:spcPct val="150000"/>
+              </a:lnSpc>
+            </a:pPr>
+            <a:r>
+              <a:rPr lang="en-US" sz="1800" i="1" dirty="0" smtClean="0"/>
               <a:t>Font Awesome icon toolkit</a:t>
             </a:r>
           </a:p>
-          <a:p>
-            <a:pPr algn="ctr"/>
-            <a:endParaRPr lang="en-US" sz="2800" dirty="0"/>
-          </a:p>
-          <a:p>
-            <a:pPr algn="ctr"/>
-            <a:r>
-              <a:rPr lang="en-US" sz="2800" smtClean="0"/>
-              <a:t>Bootstrap CDN</a:t>
-            </a:r>
-            <a:endParaRPr lang="en-US" sz="2800" dirty="0"/>
-          </a:p>
-        </p:txBody>
-      </p:sp>
+        </p:txBody>
+      </p:sp>
+      <p:sp>
+        <p:nvSpPr>
+          <p:cNvPr id="3" name="Rectangle 2"/>
+          <p:cNvSpPr/>
+          <p:nvPr/>
+        </p:nvSpPr>
+        <p:spPr>
+          <a:xfrm>
+            <a:off x="3649610" y="163806"/>
+            <a:ext cx="4519186" cy="477054"/>
+          </a:xfrm>
+          <a:prstGeom prst="rect">
+            <a:avLst/>
+          </a:prstGeom>
+        </p:spPr>
+        <p:txBody>
+          <a:bodyPr wrap="none">
+            <a:spAutoFit/>
+          </a:bodyPr>
+          <a:lstStyle/>
+          <a:p>
+            <a:r>
+              <a:rPr lang="en-US" sz="2500" b="1" dirty="0">
+                <a:latin typeface="Times New Roman" panose="02020603050405020304" pitchFamily="18" charset="0"/>
+                <a:cs typeface="Times New Roman" panose="02020603050405020304" pitchFamily="18" charset="0"/>
+              </a:rPr>
+              <a:t>CSS </a:t>
+            </a:r>
+            <a:r>
+              <a:rPr lang="en-US" sz="2500" b="1" dirty="0" smtClean="0">
+                <a:latin typeface="Times New Roman" panose="02020603050405020304" pitchFamily="18" charset="0"/>
+                <a:cs typeface="Times New Roman" panose="02020603050405020304" pitchFamily="18" charset="0"/>
+              </a:rPr>
+              <a:t>FRAMEWORK &amp; ICONS</a:t>
+            </a:r>
+            <a:endParaRPr lang="en-US" sz="2500" dirty="0">
+              <a:latin typeface="Times New Roman" panose="02020603050405020304" pitchFamily="18" charset="0"/>
+              <a:cs typeface="Times New Roman" panose="02020603050405020304" pitchFamily="18" charset="0"/>
+            </a:endParaRPr>
+          </a:p>
+        </p:txBody>
+      </p:sp>
+      <p:pic>
+        <p:nvPicPr>
+          <p:cNvPr id="4" name="Picture 3"/>
+          <p:cNvPicPr>
+            <a:picLocks noChangeAspect="1"/>
+          </p:cNvPicPr>
+          <p:nvPr/>
+        </p:nvPicPr>
+        <p:blipFill>
+          <a:blip r:embed="rId4"/>
+          <a:stretch>
+            <a:fillRect/>
+          </a:stretch>
+        </p:blipFill>
+        <p:spPr>
+          <a:xfrm>
+            <a:off x="7167865" y="2064610"/>
+            <a:ext cx="3202684" cy="2292562"/>
+          </a:xfrm>
+          <a:prstGeom prst="rect">
+            <a:avLst/>
+          </a:prstGeom>
+        </p:spPr>
+      </p:pic>
+      <p:pic>
+        <p:nvPicPr>
+          <p:cNvPr id="8" name="Picture 7"/>
+          <p:cNvPicPr>
+            <a:picLocks noChangeAspect="1"/>
+          </p:cNvPicPr>
+          <p:nvPr/>
+        </p:nvPicPr>
+        <p:blipFill>
+          <a:blip r:embed="rId5"/>
+          <a:stretch>
+            <a:fillRect/>
+          </a:stretch>
+        </p:blipFill>
+        <p:spPr>
+          <a:xfrm>
+            <a:off x="1705983" y="4652203"/>
+            <a:ext cx="1810003" cy="933580"/>
+          </a:xfrm>
+          <a:prstGeom prst="rect">
+            <a:avLst/>
+          </a:prstGeom>
+        </p:spPr>
+      </p:pic>
+      <p:pic>
+        <p:nvPicPr>
+          <p:cNvPr id="9" name="Picture 8"/>
+          <p:cNvPicPr>
+            <a:picLocks noChangeAspect="1"/>
+          </p:cNvPicPr>
+          <p:nvPr/>
+        </p:nvPicPr>
+        <p:blipFill>
+          <a:blip r:embed="rId6"/>
+          <a:stretch>
+            <a:fillRect/>
+          </a:stretch>
+        </p:blipFill>
+        <p:spPr>
+          <a:xfrm>
+            <a:off x="7898965" y="4652204"/>
+            <a:ext cx="1848219" cy="933579"/>
+          </a:xfrm>
+          <a:prstGeom prst="rect">
+            <a:avLst/>
+          </a:prstGeom>
+        </p:spPr>
+      </p:pic>
+      <p:pic>
+        <p:nvPicPr>
+          <p:cNvPr id="12" name="Picture 11"/>
+          <p:cNvPicPr>
+            <a:picLocks noChangeAspect="1"/>
+          </p:cNvPicPr>
+          <p:nvPr/>
+        </p:nvPicPr>
+        <p:blipFill>
+          <a:blip r:embed="rId7"/>
+          <a:stretch>
+            <a:fillRect/>
+          </a:stretch>
+        </p:blipFill>
+        <p:spPr>
+          <a:xfrm>
+            <a:off x="961349" y="3058177"/>
+            <a:ext cx="3264287" cy="1528430"/>
+          </a:xfrm>
+          <a:prstGeom prst="rect">
+            <a:avLst/>
+          </a:prstGeom>
+        </p:spPr>
+      </p:pic>
     </p:spTree>
     <p:extLst>
       <p:ext uri="{BB962C8B-B14F-4D97-AF65-F5344CB8AC3E}">
@@ -3332,12 +3786,29 @@
   <p:clrMapOvr>
     <a:masterClrMapping/>
   </p:clrMapOvr>
+  <p:timing>
+    <p:tnLst>
+      <p:par>
+        <p:cTn id="1" dur="indefinite" restart="never" nodeType="tmRoot"/>
+      </p:par>
+    </p:tnLst>
+  </p:timing>
 </p:sld>
 </file>
 
 <file path=ppt/slides/slide3.xml><?xml version="1.0" encoding="utf-8"?>
 <p:sld xmlns:a="http://schemas.openxmlformats.org/drawingml/2006/main" xmlns:r="http://schemas.openxmlformats.org/officeDocument/2006/relationships" xmlns:p="http://schemas.openxmlformats.org/presentationml/2006/main">
   <p:cSld>
+    <p:bg>
+      <p:bgPr>
+        <a:solidFill>
+          <a:schemeClr val="bg1">
+            <a:lumMod val="95000"/>
+          </a:schemeClr>
+        </a:solidFill>
+        <a:effectLst/>
+      </p:bgPr>
+    </p:bg>
     <p:spTree>
       <p:nvGrpSpPr>
         <p:cNvPr id="1" name=""/>
@@ -3362,17 +3833,30 @@
             <p:ph type="title"/>
           </p:nvPr>
         </p:nvSpPr>
-        <p:spPr/>
-        <p:txBody>
-          <a:bodyPr/>
+        <p:spPr>
+          <a:xfrm>
+            <a:off x="4987636" y="441325"/>
+            <a:ext cx="2673927" cy="549275"/>
+          </a:xfrm>
+        </p:spPr>
+        <p:txBody>
+          <a:bodyPr>
+            <a:normAutofit fontScale="90000"/>
+          </a:bodyPr>
           <a:lstStyle/>
           <a:p>
             <a:pPr algn="ctr"/>
             <a:r>
-              <a:rPr lang="en-US" b="1" dirty="0" smtClean="0"/>
+              <a:rPr lang="en-US" sz="3500" b="1" dirty="0" smtClean="0">
+                <a:latin typeface="Times New Roman" panose="02020603050405020304" pitchFamily="18" charset="0"/>
+                <a:cs typeface="Times New Roman" panose="02020603050405020304" pitchFamily="18" charset="0"/>
+              </a:rPr>
               <a:t>Encryption</a:t>
             </a:r>
-            <a:endParaRPr lang="en-US" b="1" dirty="0"/>
+            <a:endParaRPr lang="en-US" sz="3500" b="1" dirty="0">
+              <a:latin typeface="Times New Roman" panose="02020603050405020304" pitchFamily="18" charset="0"/>
+              <a:cs typeface="Times New Roman" panose="02020603050405020304" pitchFamily="18" charset="0"/>
+            </a:endParaRPr>
           </a:p>
         </p:txBody>
       </p:sp>
@@ -3400,7 +3884,7 @@
         </p:blipFill>
         <p:spPr>
           <a:xfrm>
-            <a:off x="1195277" y="1567603"/>
+            <a:off x="4245184" y="1474819"/>
             <a:ext cx="3889375" cy="2719387"/>
           </a:xfrm>
         </p:spPr>
@@ -3427,8 +3911,8 @@
         </p:blipFill>
         <p:spPr>
           <a:xfrm>
-            <a:off x="5084652" y="4286990"/>
-            <a:ext cx="6580480" cy="2427319"/>
+            <a:off x="3020291" y="4336140"/>
+            <a:ext cx="6753729" cy="1729020"/>
           </a:xfrm>
           <a:prstGeom prst="rect">
             <a:avLst/>
@@ -3445,8 +3929,8 @@
         </p:nvSpPr>
         <p:spPr>
           <a:xfrm>
-            <a:off x="5084652" y="1601733"/>
-            <a:ext cx="6748120" cy="2685257"/>
+            <a:off x="8134559" y="1755399"/>
+            <a:ext cx="3837480" cy="2158226"/>
           </a:xfrm>
           <a:prstGeom prst="rect">
             <a:avLst/>
@@ -3476,34 +3960,47 @@
             </a:lvl1pPr>
           </a:lstStyle>
           <a:p>
-            <a:pPr algn="ctr"/>
-            <a:r>
-              <a:rPr lang="en-US" sz="2800" b="1" dirty="0" smtClean="0"/>
-              <a:t>Message-Digest Algorithm</a:t>
-            </a:r>
-          </a:p>
-          <a:p>
-            <a:pPr algn="ctr"/>
-            <a:endParaRPr lang="en-US" sz="2800" b="1" dirty="0"/>
-          </a:p>
-          <a:p>
-            <a:pPr algn="ctr"/>
-            <a:r>
-              <a:rPr lang="en-US" sz="2800" b="1" dirty="0" smtClean="0"/>
-              <a:t>Produce 128-bit hashed value</a:t>
-            </a:r>
-          </a:p>
-          <a:p>
-            <a:pPr algn="ctr"/>
-            <a:endParaRPr lang="en-US" sz="2800" b="1" dirty="0"/>
-          </a:p>
-          <a:p>
-            <a:pPr algn="ctr"/>
-            <a:r>
-              <a:rPr lang="en-US" sz="2800" b="1" dirty="0" smtClean="0"/>
+            <a:pPr algn="ctr">
+              <a:lnSpc>
+                <a:spcPct val="150000"/>
+              </a:lnSpc>
+            </a:pPr>
+            <a:r>
+              <a:rPr lang="en-US" sz="2200" b="1" u="sng" dirty="0" smtClean="0"/>
+              <a:t>Message-Digest </a:t>
+            </a:r>
+            <a:r>
+              <a:rPr lang="en-US" sz="2200" b="1" u="sng" dirty="0" smtClean="0"/>
+              <a:t>Algorithm</a:t>
+            </a:r>
+            <a:endParaRPr lang="en-US" sz="2200" b="1" u="sng" dirty="0"/>
+          </a:p>
+          <a:p>
+            <a:pPr algn="ctr">
+              <a:lnSpc>
+                <a:spcPct val="150000"/>
+              </a:lnSpc>
+            </a:pPr>
+            <a:r>
+              <a:rPr lang="en-US" sz="2200" b="1" u="sng" dirty="0" smtClean="0"/>
+              <a:t>Produce 128-bit hashed </a:t>
+            </a:r>
+            <a:r>
+              <a:rPr lang="en-US" sz="2200" b="1" u="sng" dirty="0" smtClean="0"/>
+              <a:t>value</a:t>
+            </a:r>
+          </a:p>
+          <a:p>
+            <a:pPr algn="ctr">
+              <a:lnSpc>
+                <a:spcPct val="150000"/>
+              </a:lnSpc>
+            </a:pPr>
+            <a:r>
+              <a:rPr lang="en-US" sz="2200" b="1" u="sng" dirty="0" smtClean="0"/>
               <a:t>Not Reversible Function</a:t>
             </a:r>
-            <a:endParaRPr lang="en-US" sz="2800" b="1" dirty="0"/>
+            <a:endParaRPr lang="en-US" sz="2200" b="1" u="sng" dirty="0"/>
           </a:p>
         </p:txBody>
       </p:sp>
@@ -3517,8 +4014,8 @@
         </p:nvSpPr>
         <p:spPr>
           <a:xfrm>
-            <a:off x="1195276" y="4321121"/>
-            <a:ext cx="3889375" cy="2393188"/>
+            <a:off x="-125924" y="1564589"/>
+            <a:ext cx="4371108" cy="2349036"/>
           </a:xfrm>
           <a:prstGeom prst="rect">
             <a:avLst/>
@@ -3548,27 +4045,32 @@
             </a:lvl1pPr>
           </a:lstStyle>
           <a:p>
-            <a:pPr algn="ctr"/>
-            <a:r>
-              <a:rPr lang="en-US" sz="2800" b="1" dirty="0" smtClean="0"/>
-              <a:t>Huge Number of Hash Database</a:t>
-            </a:r>
-          </a:p>
-          <a:p>
-            <a:pPr algn="ctr"/>
-            <a:endParaRPr lang="en-US" sz="2800" b="1" dirty="0" smtClean="0"/>
+            <a:pPr algn="ctr">
+              <a:lnSpc>
+                <a:spcPct val="150000"/>
+              </a:lnSpc>
+            </a:pPr>
+            <a:r>
+              <a:rPr lang="en-US" sz="2500" b="1" u="sng" dirty="0" smtClean="0"/>
+              <a:t>Huge Number of Hash </a:t>
+            </a:r>
+            <a:r>
+              <a:rPr lang="en-US" sz="2500" b="1" u="sng" dirty="0" smtClean="0"/>
+              <a:t>Database</a:t>
+            </a:r>
+            <a:endParaRPr lang="en-US" sz="2500" b="1" u="sng" dirty="0" smtClean="0"/>
           </a:p>
           <a:p>
             <a:pPr lvl="0" algn="ctr">
               <a:lnSpc>
-                <a:spcPct val="100000"/>
+                <a:spcPct val="150000"/>
               </a:lnSpc>
               <a:spcBef>
                 <a:spcPts val="0"/>
               </a:spcBef>
             </a:pPr>
             <a:r>
-              <a:rPr lang="en-US" sz="2800" dirty="0">
+              <a:rPr lang="en-US" sz="2500" u="sng" dirty="0">
                 <a:solidFill>
                   <a:prstClr val="black"/>
                 </a:solidFill>
@@ -3595,12 +4097,29 @@
   <p:clrMapOvr>
     <a:masterClrMapping/>
   </p:clrMapOvr>
+  <p:timing>
+    <p:tnLst>
+      <p:par>
+        <p:cTn id="1" dur="indefinite" restart="never" nodeType="tmRoot"/>
+      </p:par>
+    </p:tnLst>
+  </p:timing>
 </p:sld>
 </file>
 
 <file path=ppt/slides/slide4.xml><?xml version="1.0" encoding="utf-8"?>
 <p:sld xmlns:a="http://schemas.openxmlformats.org/drawingml/2006/main" xmlns:r="http://schemas.openxmlformats.org/officeDocument/2006/relationships" xmlns:p="http://schemas.openxmlformats.org/presentationml/2006/main">
   <p:cSld>
+    <p:bg>
+      <p:bgPr>
+        <a:solidFill>
+          <a:schemeClr val="bg1">
+            <a:lumMod val="95000"/>
+          </a:schemeClr>
+        </a:solidFill>
+        <a:effectLst/>
+      </p:bgPr>
+    </p:bg>
     <p:spTree>
       <p:nvGrpSpPr>
         <p:cNvPr id="1" name=""/>
@@ -3625,78 +4144,40 @@
             <p:ph type="title"/>
           </p:nvPr>
         </p:nvSpPr>
-        <p:spPr/>
-        <p:txBody>
-          <a:bodyPr/>
+        <p:spPr>
+          <a:xfrm>
+            <a:off x="3380509" y="183820"/>
+            <a:ext cx="5479473" cy="902566"/>
+          </a:xfrm>
+        </p:spPr>
+        <p:txBody>
+          <a:bodyPr>
+            <a:normAutofit/>
+          </a:bodyPr>
           <a:lstStyle/>
           <a:p>
             <a:pPr algn="ctr"/>
             <a:r>
-              <a:rPr lang="en-US" dirty="0" smtClean="0"/>
-              <a:t>Online Meeting </a:t>
-            </a:r>
-            <a:endParaRPr lang="en-US" dirty="0"/>
-          </a:p>
-        </p:txBody>
-      </p:sp>
-      <p:pic>
-        <p:nvPicPr>
-          <p:cNvPr id="5" name="Content Placeholder 4"/>
-          <p:cNvPicPr>
-            <a:picLocks noGrp="1" noChangeAspect="1"/>
-          </p:cNvPicPr>
-          <p:nvPr>
-            <p:ph sz="half" idx="1"/>
-          </p:nvPr>
-        </p:nvPicPr>
-        <p:blipFill>
-          <a:blip r:embed="rId2" cstate="print">
-            <a:extLst>
-              <a:ext uri="{28A0092B-C50C-407E-A947-70E740481C1C}">
-                <a14:useLocalDpi xmlns:a14="http://schemas.microsoft.com/office/drawing/2010/main" val="0"/>
-              </a:ext>
-            </a:extLst>
-          </a:blip>
-          <a:stretch>
-            <a:fillRect/>
-          </a:stretch>
-        </p:blipFill>
-        <p:spPr>
-          <a:xfrm>
-            <a:off x="1417319" y="1825625"/>
-            <a:ext cx="3906093" cy="1962604"/>
-          </a:xfrm>
-        </p:spPr>
-      </p:pic>
-      <p:pic>
-        <p:nvPicPr>
-          <p:cNvPr id="6" name="Content Placeholder 5"/>
-          <p:cNvPicPr>
-            <a:picLocks noGrp="1" noChangeAspect="1"/>
-          </p:cNvPicPr>
-          <p:nvPr>
-            <p:ph sz="half" idx="2"/>
-          </p:nvPr>
-        </p:nvPicPr>
-        <p:blipFill>
-          <a:blip r:embed="rId3" cstate="print">
-            <a:extLst>
-              <a:ext uri="{28A0092B-C50C-407E-A947-70E740481C1C}">
-                <a14:useLocalDpi xmlns:a14="http://schemas.microsoft.com/office/drawing/2010/main" val="0"/>
-              </a:ext>
-            </a:extLst>
-          </a:blip>
-          <a:stretch>
-            <a:fillRect/>
-          </a:stretch>
-        </p:blipFill>
-        <p:spPr>
-          <a:xfrm>
-            <a:off x="7106194" y="4165517"/>
-            <a:ext cx="3868783" cy="2270975"/>
-          </a:xfrm>
-        </p:spPr>
-      </p:pic>
+              <a:rPr lang="en-US" sz="3500" b="1" dirty="0" smtClean="0">
+                <a:latin typeface="Times New Roman" panose="02020603050405020304" pitchFamily="18" charset="0"/>
+                <a:cs typeface="Times New Roman" panose="02020603050405020304" pitchFamily="18" charset="0"/>
+              </a:rPr>
+              <a:t>Online </a:t>
+            </a:r>
+            <a:r>
+              <a:rPr lang="en-US" sz="3500" b="1" dirty="0" smtClean="0">
+                <a:latin typeface="Times New Roman" panose="02020603050405020304" pitchFamily="18" charset="0"/>
+                <a:cs typeface="Times New Roman" panose="02020603050405020304" pitchFamily="18" charset="0"/>
+              </a:rPr>
+              <a:t>Meetings</a:t>
+            </a:r>
+            <a:endParaRPr lang="en-US" sz="3500" b="1" dirty="0">
+              <a:latin typeface="Times New Roman" panose="02020603050405020304" pitchFamily="18" charset="0"/>
+              <a:cs typeface="Times New Roman" panose="02020603050405020304" pitchFamily="18" charset="0"/>
+            </a:endParaRPr>
+          </a:p>
+        </p:txBody>
+      </p:sp>
       <p:sp>
         <p:nvSpPr>
           <p:cNvPr id="7" name="Title 1"/>
@@ -3707,8 +4188,85 @@
         </p:nvSpPr>
         <p:spPr>
           <a:xfrm>
-            <a:off x="5323411" y="1825625"/>
-            <a:ext cx="6868589" cy="2223861"/>
+            <a:off x="-506635" y="2713409"/>
+            <a:ext cx="4502727" cy="700851"/>
+          </a:xfrm>
+          <a:prstGeom prst="rect">
+            <a:avLst/>
+          </a:prstGeom>
+        </p:spPr>
+        <p:txBody>
+          <a:bodyPr vert="horz" lIns="91440" tIns="45720" rIns="91440" bIns="45720" rtlCol="0" anchor="ctr">
+            <a:normAutofit fontScale="92500" lnSpcReduction="10000"/>
+          </a:bodyPr>
+          <a:lstStyle>
+            <a:lvl1pPr algn="l" defTabSz="914400" rtl="0" eaLnBrk="1" latinLnBrk="0" hangingPunct="1">
+              <a:lnSpc>
+                <a:spcPct val="90000"/>
+              </a:lnSpc>
+              <a:spcBef>
+                <a:spcPct val="0"/>
+              </a:spcBef>
+              <a:buNone/>
+              <a:defRPr sz="4400" kern="1200">
+                <a:solidFill>
+                  <a:schemeClr val="tx1"/>
+                </a:solidFill>
+                <a:latin typeface="+mj-lt"/>
+                <a:ea typeface="+mj-ea"/>
+                <a:cs typeface="+mj-cs"/>
+              </a:defRPr>
+            </a:lvl1pPr>
+          </a:lstStyle>
+          <a:p>
+            <a:pPr algn="ctr"/>
+            <a:r>
+              <a:rPr lang="en-US" sz="2500" b="1" spc="300" dirty="0" smtClean="0">
+                <a:latin typeface="Times New Roman" panose="02020603050405020304" pitchFamily="18" charset="0"/>
+                <a:ea typeface="Microsoft Himalaya" panose="01010100010101010101" pitchFamily="2" charset="0"/>
+                <a:cs typeface="Times New Roman" panose="02020603050405020304" pitchFamily="18" charset="0"/>
+              </a:rPr>
+              <a:t>Use Google</a:t>
+            </a:r>
+          </a:p>
+          <a:p>
+            <a:pPr algn="ctr"/>
+            <a:r>
+              <a:rPr lang="en-US" sz="2500" b="1" spc="300" dirty="0" smtClean="0">
+                <a:latin typeface="Times New Roman" panose="02020603050405020304" pitchFamily="18" charset="0"/>
+                <a:ea typeface="Microsoft Himalaya" panose="01010100010101010101" pitchFamily="2" charset="0"/>
+                <a:cs typeface="Times New Roman" panose="02020603050405020304" pitchFamily="18" charset="0"/>
+              </a:rPr>
+              <a:t> </a:t>
+            </a:r>
+            <a:r>
+              <a:rPr lang="en-US" sz="2500" b="1" spc="300" dirty="0" smtClean="0">
+                <a:latin typeface="Times New Roman" panose="02020603050405020304" pitchFamily="18" charset="0"/>
+                <a:ea typeface="Microsoft Himalaya" panose="01010100010101010101" pitchFamily="2" charset="0"/>
+                <a:cs typeface="Times New Roman" panose="02020603050405020304" pitchFamily="18" charset="0"/>
+              </a:rPr>
+              <a:t>Meet</a:t>
+            </a:r>
+            <a:endParaRPr lang="en-US" sz="2500" b="1" spc="300" dirty="0">
+              <a:latin typeface="Times New Roman" panose="02020603050405020304" pitchFamily="18" charset="0"/>
+              <a:ea typeface="Microsoft Himalaya" panose="01010100010101010101" pitchFamily="2" charset="0"/>
+              <a:cs typeface="Times New Roman" panose="02020603050405020304" pitchFamily="18" charset="0"/>
+            </a:endParaRPr>
+          </a:p>
+        </p:txBody>
+      </p:sp>
+      <p:sp>
+        <p:nvSpPr>
+          <p:cNvPr id="8" name="Title 1"/>
+          <p:cNvSpPr txBox="1">
+            <a:spLocks/>
+          </p:cNvSpPr>
+          <p:nvPr/>
+        </p:nvSpPr>
+        <p:spPr>
+          <a:xfrm>
+            <a:off x="7980218" y="2670857"/>
+            <a:ext cx="4010890" cy="785957"/>
           </a:xfrm>
           <a:prstGeom prst="rect">
             <a:avLst/>
@@ -3740,63 +4298,215 @@
           <a:p>
             <a:pPr algn="ctr"/>
             <a:r>
-              <a:rPr lang="en-US" sz="2800" b="1" dirty="0" smtClean="0"/>
-              <a:t>Schedule a Meeting Using Google Meet</a:t>
-            </a:r>
-            <a:endParaRPr lang="en-US" sz="2800" b="1" dirty="0"/>
-          </a:p>
-        </p:txBody>
-      </p:sp>
-      <p:sp>
-        <p:nvSpPr>
-          <p:cNvPr id="8" name="Title 1"/>
-          <p:cNvSpPr txBox="1">
-            <a:spLocks/>
-          </p:cNvSpPr>
+              <a:rPr lang="en-US" sz="2300" b="1" spc="300" dirty="0" smtClean="0">
+                <a:latin typeface="Times New Roman" panose="02020603050405020304" pitchFamily="18" charset="0"/>
+                <a:cs typeface="Times New Roman" panose="02020603050405020304" pitchFamily="18" charset="0"/>
+              </a:rPr>
+              <a:t>Use Zoom</a:t>
+            </a:r>
+            <a:endParaRPr lang="en-US" sz="2300" b="1" spc="300" dirty="0" smtClean="0">
+              <a:latin typeface="Times New Roman" panose="02020603050405020304" pitchFamily="18" charset="0"/>
+              <a:cs typeface="Times New Roman" panose="02020603050405020304" pitchFamily="18" charset="0"/>
+            </a:endParaRPr>
+          </a:p>
+          <a:p>
+            <a:pPr algn="ctr"/>
+            <a:endParaRPr lang="en-US" sz="2300" b="1" spc="300" dirty="0"/>
+          </a:p>
+        </p:txBody>
+      </p:sp>
+      <p:pic>
+        <p:nvPicPr>
+          <p:cNvPr id="9" name="Picture 8"/>
+          <p:cNvPicPr>
+            <a:picLocks noChangeAspect="1"/>
+          </p:cNvPicPr>
           <p:nvPr/>
-        </p:nvSpPr>
-        <p:spPr>
-          <a:xfrm>
-            <a:off x="992776" y="4049486"/>
-            <a:ext cx="4676503" cy="2223861"/>
+        </p:nvPicPr>
+        <p:blipFill>
+          <a:blip r:embed="rId2">
+            <a:extLst>
+              <a:ext uri="{28A0092B-C50C-407E-A947-70E740481C1C}">
+                <a14:useLocalDpi xmlns:a14="http://schemas.microsoft.com/office/drawing/2010/main" val="0"/>
+              </a:ext>
+            </a:extLst>
+          </a:blip>
+          <a:stretch>
+            <a:fillRect/>
+          </a:stretch>
+        </p:blipFill>
+        <p:spPr>
+          <a:xfrm>
+            <a:off x="3815513" y="2670856"/>
+            <a:ext cx="4345284" cy="2926277"/>
           </a:xfrm>
           <a:prstGeom prst="rect">
             <a:avLst/>
           </a:prstGeom>
         </p:spPr>
-        <p:txBody>
-          <a:bodyPr vert="horz" lIns="91440" tIns="45720" rIns="91440" bIns="45720" rtlCol="0" anchor="ctr">
-            <a:normAutofit/>
+      </p:pic>
+      <p:sp>
+        <p:nvSpPr>
+          <p:cNvPr id="10" name="Rectangle 9"/>
+          <p:cNvSpPr/>
+          <p:nvPr/>
+        </p:nvSpPr>
+        <p:spPr>
+          <a:xfrm>
+            <a:off x="4616353" y="2194359"/>
+            <a:ext cx="2896947" cy="369332"/>
+          </a:xfrm>
+          <a:prstGeom prst="rect">
+            <a:avLst/>
+          </a:prstGeom>
+        </p:spPr>
+        <p:txBody>
+          <a:bodyPr wrap="none">
+            <a:spAutoFit/>
           </a:bodyPr>
-          <a:lstStyle>
-            <a:lvl1pPr algn="l" defTabSz="914400" rtl="0" eaLnBrk="1" latinLnBrk="0" hangingPunct="1">
-              <a:lnSpc>
-                <a:spcPct val="90000"/>
-              </a:lnSpc>
-              <a:spcBef>
-                <a:spcPct val="0"/>
-              </a:spcBef>
-              <a:buNone/>
-              <a:defRPr sz="4400" kern="1200">
+          <a:lstStyle/>
+          <a:p>
+            <a:r>
+              <a:rPr lang="en-US" b="1" spc="300" dirty="0">
+                <a:latin typeface="Times New Roman" panose="02020603050405020304" pitchFamily="18" charset="0"/>
+                <a:ea typeface="Microsoft Himalaya" panose="01010100010101010101" pitchFamily="2" charset="0"/>
+                <a:cs typeface="Times New Roman" panose="02020603050405020304" pitchFamily="18" charset="0"/>
+              </a:rPr>
+              <a:t>Schedule a Meeting </a:t>
+            </a:r>
+            <a:endParaRPr lang="en-US" dirty="0"/>
+          </a:p>
+        </p:txBody>
+      </p:sp>
+      <p:sp>
+        <p:nvSpPr>
+          <p:cNvPr id="11" name="Rectangle 10"/>
+          <p:cNvSpPr/>
+          <p:nvPr/>
+        </p:nvSpPr>
+        <p:spPr>
+          <a:xfrm>
+            <a:off x="457200" y="3512600"/>
+            <a:ext cx="2923309" cy="923330"/>
+          </a:xfrm>
+          <a:prstGeom prst="rect">
+            <a:avLst/>
+          </a:prstGeom>
+        </p:spPr>
+        <p:txBody>
+          <a:bodyPr wrap="square">
+            <a:spAutoFit/>
+          </a:bodyPr>
+          <a:lstStyle/>
+          <a:p>
+            <a:pPr algn="just"/>
+            <a:r>
+              <a:rPr lang="en-US" dirty="0">
                 <a:solidFill>
-                  <a:schemeClr val="tx1"/>
+                  <a:srgbClr val="4D5156"/>
                 </a:solidFill>
-                <a:latin typeface="+mj-lt"/>
-                <a:ea typeface="+mj-ea"/>
-                <a:cs typeface="+mj-cs"/>
-              </a:defRPr>
-            </a:lvl1pPr>
-          </a:lstStyle>
-          <a:p>
-            <a:pPr algn="ctr"/>
-            <a:r>
-              <a:rPr lang="en-US" sz="2800" b="1" dirty="0" smtClean="0"/>
-              <a:t>Schedule a Meeting Using Zoom</a:t>
-            </a:r>
-          </a:p>
-          <a:p>
-            <a:pPr algn="ctr"/>
-            <a:endParaRPr lang="en-US" sz="2800" b="1" dirty="0"/>
+                <a:latin typeface="arial" panose="020B0604020202020204" pitchFamily="34" charset="0"/>
+              </a:rPr>
+              <a:t>Google Meet is a </a:t>
+            </a:r>
+            <a:r>
+              <a:rPr lang="en-US" dirty="0" smtClean="0">
+                <a:solidFill>
+                  <a:srgbClr val="4D5156"/>
+                </a:solidFill>
+                <a:latin typeface="arial" panose="020B0604020202020204" pitchFamily="34" charset="0"/>
+              </a:rPr>
+              <a:t>video-communication-service </a:t>
+            </a:r>
+            <a:r>
+              <a:rPr lang="en-US" dirty="0">
+                <a:solidFill>
+                  <a:srgbClr val="4D5156"/>
+                </a:solidFill>
+                <a:latin typeface="arial" panose="020B0604020202020204" pitchFamily="34" charset="0"/>
+              </a:rPr>
+              <a:t>developed by Google. </a:t>
+            </a:r>
+            <a:endParaRPr lang="en-US" dirty="0"/>
+          </a:p>
+        </p:txBody>
+      </p:sp>
+      <p:sp>
+        <p:nvSpPr>
+          <p:cNvPr id="12" name="Rectangle 11"/>
+          <p:cNvSpPr/>
+          <p:nvPr/>
+        </p:nvSpPr>
+        <p:spPr>
+          <a:xfrm>
+            <a:off x="8756073" y="3395331"/>
+            <a:ext cx="3290455" cy="1477328"/>
+          </a:xfrm>
+          <a:prstGeom prst="rect">
+            <a:avLst/>
+          </a:prstGeom>
+        </p:spPr>
+        <p:txBody>
+          <a:bodyPr wrap="square">
+            <a:spAutoFit/>
+          </a:bodyPr>
+          <a:lstStyle/>
+          <a:p>
+            <a:r>
+              <a:rPr lang="en-US" dirty="0">
+                <a:solidFill>
+                  <a:srgbClr val="4D5156"/>
+                </a:solidFill>
+                <a:latin typeface="arial" panose="020B0604020202020204" pitchFamily="34" charset="0"/>
+              </a:rPr>
+              <a:t>Zoom Video </a:t>
+            </a:r>
+            <a:r>
+              <a:rPr lang="en-US" dirty="0" smtClean="0">
+                <a:solidFill>
+                  <a:srgbClr val="4D5156"/>
+                </a:solidFill>
+                <a:latin typeface="arial" panose="020B0604020202020204" pitchFamily="34" charset="0"/>
+              </a:rPr>
+              <a:t>Communications</a:t>
+            </a:r>
+            <a:r>
+              <a:rPr lang="en-US" dirty="0">
+                <a:solidFill>
+                  <a:srgbClr val="4D5156"/>
+                </a:solidFill>
+                <a:latin typeface="arial" panose="020B0604020202020204" pitchFamily="34" charset="0"/>
+              </a:rPr>
+              <a:t>, Inc. is an American communications technology </a:t>
+            </a:r>
+            <a:r>
+              <a:rPr lang="en-US" dirty="0" smtClean="0">
+                <a:solidFill>
+                  <a:srgbClr val="4D5156"/>
+                </a:solidFill>
+                <a:latin typeface="arial" panose="020B0604020202020204" pitchFamily="34" charset="0"/>
+              </a:rPr>
+              <a:t>company, It </a:t>
+            </a:r>
+            <a:r>
+              <a:rPr lang="en-US" dirty="0">
+                <a:solidFill>
+                  <a:srgbClr val="4D5156"/>
+                </a:solidFill>
+                <a:latin typeface="arial" panose="020B0604020202020204" pitchFamily="34" charset="0"/>
+              </a:rPr>
+              <a:t>provides </a:t>
+            </a:r>
+            <a:r>
+              <a:rPr lang="en-US" dirty="0" smtClean="0">
+                <a:solidFill>
+                  <a:srgbClr val="4D5156"/>
+                </a:solidFill>
+                <a:latin typeface="arial" panose="020B0604020202020204" pitchFamily="34" charset="0"/>
+              </a:rPr>
+              <a:t>video telephony</a:t>
+            </a:r>
+            <a:endParaRPr lang="en-US" dirty="0"/>
           </a:p>
         </p:txBody>
       </p:sp>
@@ -3810,12 +4520,29 @@
   <p:clrMapOvr>
     <a:masterClrMapping/>
   </p:clrMapOvr>
+  <p:timing>
+    <p:tnLst>
+      <p:par>
+        <p:cTn id="1" dur="indefinite" restart="never" nodeType="tmRoot"/>
+      </p:par>
+    </p:tnLst>
+  </p:timing>
 </p:sld>
 </file>
 
 <file path=ppt/slides/slide5.xml><?xml version="1.0" encoding="utf-8"?>
 <p:sld xmlns:a="http://schemas.openxmlformats.org/drawingml/2006/main" xmlns:r="http://schemas.openxmlformats.org/officeDocument/2006/relationships" xmlns:p="http://schemas.openxmlformats.org/presentationml/2006/main">
   <p:cSld>
+    <p:bg>
+      <p:bgPr>
+        <a:solidFill>
+          <a:schemeClr val="bg1">
+            <a:lumMod val="95000"/>
+          </a:schemeClr>
+        </a:solidFill>
+        <a:effectLst/>
+      </p:bgPr>
+    </p:bg>
     <p:spTree>
       <p:nvGrpSpPr>
         <p:cNvPr id="1" name=""/>
@@ -3830,59 +4557,80 @@
           <a:chExt cx="0" cy="0"/>
         </a:xfrm>
       </p:grpSpPr>
-      <p:sp>
-        <p:nvSpPr>
-          <p:cNvPr id="2" name="Title 1"/>
-          <p:cNvSpPr>
-            <a:spLocks noGrp="1"/>
-          </p:cNvSpPr>
-          <p:nvPr>
-            <p:ph type="title"/>
-          </p:nvPr>
-        </p:nvSpPr>
-        <p:spPr/>
-        <p:txBody>
-          <a:bodyPr/>
-          <a:lstStyle/>
-          <a:p>
-            <a:pPr algn="ctr"/>
-            <a:r>
-              <a:rPr lang="en-US" b="1" dirty="0" smtClean="0"/>
-              <a:t>Video.js</a:t>
-            </a:r>
-            <a:endParaRPr lang="en-US" b="1" dirty="0"/>
-          </a:p>
-        </p:txBody>
-      </p:sp>
       <p:pic>
         <p:nvPicPr>
-          <p:cNvPr id="4" name="Content Placeholder 3"/>
+          <p:cNvPr id="16" name="Picture 15"/>
           <p:cNvPicPr>
-            <a:picLocks noGrp="1" noChangeAspect="1"/>
+            <a:picLocks noChangeAspect="1"/>
           </p:cNvPicPr>
-          <p:nvPr>
-            <p:ph idx="1"/>
-          </p:nvPr>
+          <p:nvPr/>
         </p:nvPicPr>
         <p:blipFill>
-          <a:blip r:embed="rId2" cstate="print">
-            <a:extLst>
-              <a:ext uri="{28A0092B-C50C-407E-A947-70E740481C1C}">
-                <a14:useLocalDpi xmlns:a14="http://schemas.microsoft.com/office/drawing/2010/main" val="0"/>
-              </a:ext>
-            </a:extLst>
-          </a:blip>
+          <a:blip r:embed="rId2"/>
           <a:stretch>
             <a:fillRect/>
           </a:stretch>
         </p:blipFill>
         <p:spPr>
           <a:xfrm>
-            <a:off x="859970" y="1782128"/>
-            <a:ext cx="5236029" cy="4351338"/>
-          </a:xfrm>
+            <a:off x="4184443" y="1116857"/>
+            <a:ext cx="2353660" cy="773885"/>
+          </a:xfrm>
+          <a:prstGeom prst="roundRect">
+            <a:avLst>
+              <a:gd name="adj" fmla="val 8594"/>
+            </a:avLst>
+          </a:prstGeom>
+          <a:solidFill>
+            <a:srgbClr val="FFFFFF">
+              <a:shade val="85000"/>
+            </a:srgbClr>
+          </a:solidFill>
+          <a:ln>
+            <a:noFill/>
+          </a:ln>
+          <a:effectLst>
+            <a:reflection blurRad="12700" stA="38000" endPos="28000" dist="5000" dir="5400000" sy="-100000" algn="bl" rotWithShape="0"/>
+          </a:effectLst>
         </p:spPr>
       </p:pic>
+      <p:sp>
+        <p:nvSpPr>
+          <p:cNvPr id="2" name="Title 1"/>
+          <p:cNvSpPr>
+            <a:spLocks noGrp="1"/>
+          </p:cNvSpPr>
+          <p:nvPr>
+            <p:ph type="title"/>
+          </p:nvPr>
+        </p:nvSpPr>
+        <p:spPr>
+          <a:xfrm>
+            <a:off x="4653397" y="185692"/>
+            <a:ext cx="2885208" cy="721781"/>
+          </a:xfrm>
+        </p:spPr>
+        <p:txBody>
+          <a:bodyPr>
+            <a:normAutofit/>
+          </a:bodyPr>
+          <a:lstStyle/>
+          <a:p>
+            <a:pPr algn="ctr"/>
+            <a:r>
+              <a:rPr lang="en-US" sz="3000" b="1" dirty="0" smtClean="0">
+                <a:latin typeface="Times New Roman" panose="02020603050405020304" pitchFamily="18" charset="0"/>
+                <a:cs typeface="Times New Roman" panose="02020603050405020304" pitchFamily="18" charset="0"/>
+              </a:rPr>
+              <a:t>Media Player</a:t>
+            </a:r>
+            <a:endParaRPr lang="en-US" sz="3000" b="1" dirty="0">
+              <a:latin typeface="Times New Roman" panose="02020603050405020304" pitchFamily="18" charset="0"/>
+              <a:cs typeface="Times New Roman" panose="02020603050405020304" pitchFamily="18" charset="0"/>
+            </a:endParaRPr>
+          </a:p>
+        </p:txBody>
+      </p:sp>
       <p:sp>
         <p:nvSpPr>
           <p:cNvPr id="5" name="Title 1"/>
@@ -3931,87 +4679,298 @@
       </p:sp>
       <p:sp>
         <p:nvSpPr>
-          <p:cNvPr id="6" name="Title 1"/>
-          <p:cNvSpPr txBox="1">
-            <a:spLocks/>
-          </p:cNvSpPr>
+          <p:cNvPr id="8" name="Rectangle 7"/>
+          <p:cNvSpPr/>
           <p:nvPr/>
         </p:nvSpPr>
         <p:spPr>
           <a:xfrm>
-            <a:off x="6096000" y="1782128"/>
-            <a:ext cx="6096001" cy="4351338"/>
+            <a:off x="87988" y="1490632"/>
+            <a:ext cx="4959166" cy="400110"/>
           </a:xfrm>
           <a:prstGeom prst="rect">
             <a:avLst/>
           </a:prstGeom>
         </p:spPr>
         <p:txBody>
-          <a:bodyPr vert="horz" lIns="91440" tIns="45720" rIns="91440" bIns="45720" rtlCol="0" anchor="ctr">
-            <a:normAutofit/>
+          <a:bodyPr wrap="square">
+            <a:spAutoFit/>
           </a:bodyPr>
-          <a:lstStyle>
-            <a:lvl1pPr algn="l" defTabSz="914400" rtl="0" eaLnBrk="1" latinLnBrk="0" hangingPunct="1">
-              <a:lnSpc>
-                <a:spcPct val="90000"/>
-              </a:lnSpc>
-              <a:spcBef>
-                <a:spcPct val="0"/>
-              </a:spcBef>
-              <a:buNone/>
-              <a:defRPr sz="4400" kern="1200">
-                <a:solidFill>
-                  <a:schemeClr val="tx1"/>
-                </a:solidFill>
-                <a:latin typeface="+mj-lt"/>
-                <a:ea typeface="+mj-ea"/>
-                <a:cs typeface="+mj-cs"/>
-              </a:defRPr>
-            </a:lvl1pPr>
-          </a:lstStyle>
-          <a:p>
-            <a:pPr algn="ctr"/>
-            <a:r>
-              <a:rPr lang="en-US" sz="2800" b="1" dirty="0" smtClean="0"/>
-              <a:t>Supports HTML5 video and Modern streaming</a:t>
-            </a:r>
-          </a:p>
-          <a:p>
-            <a:pPr algn="ctr"/>
-            <a:endParaRPr lang="en-US" sz="2800" b="1" dirty="0"/>
-          </a:p>
-          <a:p>
-            <a:pPr algn="ctr"/>
-            <a:r>
-              <a:rPr lang="en-US" sz="2800" b="1" dirty="0" smtClean="0"/>
+          <a:lstStyle/>
+          <a:p>
+            <a:r>
+              <a:rPr lang="en-US" sz="2000" i="1" dirty="0" smtClean="0">
+                <a:latin typeface="Times New Roman" panose="02020603050405020304" pitchFamily="18" charset="0"/>
+                <a:cs typeface="Times New Roman" panose="02020603050405020304" pitchFamily="18" charset="0"/>
+              </a:rPr>
+              <a:t>Supports HTML5 video and streaming</a:t>
+            </a:r>
+            <a:endParaRPr lang="en-US" sz="2000" i="1" dirty="0">
+              <a:latin typeface="Times New Roman" panose="02020603050405020304" pitchFamily="18" charset="0"/>
+              <a:cs typeface="Times New Roman" panose="02020603050405020304" pitchFamily="18" charset="0"/>
+            </a:endParaRPr>
+          </a:p>
+        </p:txBody>
+      </p:sp>
+      <p:sp>
+        <p:nvSpPr>
+          <p:cNvPr id="10" name="Rectangle 9"/>
+          <p:cNvSpPr/>
+          <p:nvPr/>
+        </p:nvSpPr>
+        <p:spPr>
+          <a:xfrm>
+            <a:off x="8239356" y="1490632"/>
+            <a:ext cx="3952645" cy="646331"/>
+          </a:xfrm>
+          <a:prstGeom prst="rect">
+            <a:avLst/>
+          </a:prstGeom>
+        </p:spPr>
+        <p:txBody>
+          <a:bodyPr wrap="square">
+            <a:spAutoFit/>
+          </a:bodyPr>
+          <a:lstStyle/>
+          <a:p>
+            <a:r>
+              <a:rPr lang="en-US" i="1" dirty="0">
+                <a:latin typeface="Times New Roman" panose="02020603050405020304" pitchFamily="18" charset="0"/>
+                <a:cs typeface="Times New Roman" panose="02020603050405020304" pitchFamily="18" charset="0"/>
+              </a:rPr>
               <a:t>Easy Plugins install Chromecast, IMA</a:t>
             </a:r>
           </a:p>
           <a:p>
-            <a:pPr algn="ctr"/>
-            <a:endParaRPr lang="en-US" sz="2800" b="1" dirty="0"/>
-          </a:p>
-          <a:p>
-            <a:pPr algn="ctr"/>
-            <a:r>
-              <a:rPr lang="en-US" sz="2800" b="1" dirty="0" smtClean="0"/>
+            <a:endParaRPr lang="en-US" dirty="0"/>
+          </a:p>
+        </p:txBody>
+      </p:sp>
+      <p:pic>
+        <p:nvPicPr>
+          <p:cNvPr id="7" name="Picture 6"/>
+          <p:cNvPicPr>
+            <a:picLocks noChangeAspect="1"/>
+          </p:cNvPicPr>
+          <p:nvPr/>
+        </p:nvPicPr>
+        <p:blipFill>
+          <a:blip r:embed="rId3"/>
+          <a:stretch>
+            <a:fillRect/>
+          </a:stretch>
+        </p:blipFill>
+        <p:spPr>
+          <a:xfrm>
+            <a:off x="4987930" y="1287993"/>
+            <a:ext cx="2448155" cy="805387"/>
+          </a:xfrm>
+          <a:prstGeom prst="roundRect">
+            <a:avLst>
+              <a:gd name="adj" fmla="val 8594"/>
+            </a:avLst>
+          </a:prstGeom>
+          <a:solidFill>
+            <a:srgbClr val="FFFFFF">
+              <a:shade val="85000"/>
+            </a:srgbClr>
+          </a:solidFill>
+          <a:ln>
+            <a:noFill/>
+          </a:ln>
+          <a:effectLst>
+            <a:reflection blurRad="12700" stA="0" endPos="28000" dist="5000" dir="5400000" sy="-100000" algn="bl" rotWithShape="0"/>
+          </a:effectLst>
+        </p:spPr>
+      </p:pic>
+      <p:sp>
+        <p:nvSpPr>
+          <p:cNvPr id="12" name="Rectangle 11"/>
+          <p:cNvSpPr/>
+          <p:nvPr/>
+        </p:nvSpPr>
+        <p:spPr>
+          <a:xfrm>
+            <a:off x="9506018" y="1976643"/>
+            <a:ext cx="2512799" cy="646331"/>
+          </a:xfrm>
+          <a:prstGeom prst="rect">
+            <a:avLst/>
+          </a:prstGeom>
+        </p:spPr>
+        <p:txBody>
+          <a:bodyPr wrap="square">
+            <a:spAutoFit/>
+          </a:bodyPr>
+          <a:lstStyle/>
+          <a:p>
+            <a:r>
+              <a:rPr lang="en-US" i="1" dirty="0">
+                <a:latin typeface="Times New Roman" panose="02020603050405020304" pitchFamily="18" charset="0"/>
+                <a:cs typeface="Times New Roman" panose="02020603050405020304" pitchFamily="18" charset="0"/>
+              </a:rPr>
               <a:t>Play Any format Videos</a:t>
             </a:r>
           </a:p>
           <a:p>
-            <a:pPr algn="ctr"/>
-            <a:endParaRPr lang="en-US" sz="2800" b="1" dirty="0"/>
-          </a:p>
-          <a:p>
-            <a:pPr algn="ctr"/>
-            <a:r>
-              <a:rPr lang="en-US" sz="2800" b="1" dirty="0" smtClean="0"/>
-              <a:t>Reliable and Consistant</a:t>
-            </a:r>
-            <a:endParaRPr lang="en-US" sz="2800" b="1" dirty="0"/>
-          </a:p>
-        </p:txBody>
-      </p:sp>
+            <a:endParaRPr lang="en-US" dirty="0"/>
+          </a:p>
+        </p:txBody>
+      </p:sp>
+      <p:sp>
+        <p:nvSpPr>
+          <p:cNvPr id="14" name="Rectangle 13"/>
+          <p:cNvSpPr/>
+          <p:nvPr/>
+        </p:nvSpPr>
+        <p:spPr>
+          <a:xfrm>
+            <a:off x="87988" y="1976644"/>
+            <a:ext cx="2403222" cy="646331"/>
+          </a:xfrm>
+          <a:prstGeom prst="rect">
+            <a:avLst/>
+          </a:prstGeom>
+        </p:spPr>
+        <p:txBody>
+          <a:bodyPr wrap="none">
+            <a:spAutoFit/>
+          </a:bodyPr>
+          <a:lstStyle/>
+          <a:p>
+            <a:r>
+              <a:rPr lang="en-US" i="1" dirty="0">
+                <a:latin typeface="Times New Roman" panose="02020603050405020304" pitchFamily="18" charset="0"/>
+                <a:cs typeface="Times New Roman" panose="02020603050405020304" pitchFamily="18" charset="0"/>
+              </a:rPr>
+              <a:t>Reliable and </a:t>
+            </a:r>
+            <a:r>
+              <a:rPr lang="en-US" i="1" dirty="0" smtClean="0">
+                <a:latin typeface="Times New Roman" panose="02020603050405020304" pitchFamily="18" charset="0"/>
+                <a:cs typeface="Times New Roman" panose="02020603050405020304" pitchFamily="18" charset="0"/>
+              </a:rPr>
+              <a:t>Consistent</a:t>
+            </a:r>
+            <a:endParaRPr lang="en-US" i="1" dirty="0">
+              <a:latin typeface="Times New Roman" panose="02020603050405020304" pitchFamily="18" charset="0"/>
+              <a:cs typeface="Times New Roman" panose="02020603050405020304" pitchFamily="18" charset="0"/>
+            </a:endParaRPr>
+          </a:p>
+          <a:p>
+            <a:endParaRPr lang="en-US" dirty="0"/>
+          </a:p>
+        </p:txBody>
+      </p:sp>
+      <p:pic>
+        <p:nvPicPr>
+          <p:cNvPr id="17" name="Picture 16"/>
+          <p:cNvPicPr>
+            <a:picLocks noChangeAspect="1"/>
+          </p:cNvPicPr>
+          <p:nvPr/>
+        </p:nvPicPr>
+        <p:blipFill>
+          <a:blip r:embed="rId4"/>
+          <a:stretch>
+            <a:fillRect/>
+          </a:stretch>
+        </p:blipFill>
+        <p:spPr>
+          <a:xfrm>
+            <a:off x="1582779" y="2673957"/>
+            <a:ext cx="4863684" cy="3999127"/>
+          </a:xfrm>
+          <a:prstGeom prst="rect">
+            <a:avLst/>
+          </a:prstGeom>
+        </p:spPr>
+      </p:pic>
+      <p:pic>
+        <p:nvPicPr>
+          <p:cNvPr id="15" name="Picture 14"/>
+          <p:cNvPicPr>
+            <a:picLocks noChangeAspect="1"/>
+          </p:cNvPicPr>
+          <p:nvPr/>
+        </p:nvPicPr>
+        <p:blipFill>
+          <a:blip r:embed="rId5"/>
+          <a:stretch>
+            <a:fillRect/>
+          </a:stretch>
+        </p:blipFill>
+        <p:spPr>
+          <a:xfrm>
+            <a:off x="4106277" y="2676047"/>
+            <a:ext cx="4863652" cy="3997037"/>
+          </a:xfrm>
+          <a:prstGeom prst="rect">
+            <a:avLst/>
+          </a:prstGeom>
+        </p:spPr>
+      </p:pic>
+      <p:pic>
+        <p:nvPicPr>
+          <p:cNvPr id="20" name="Picture 19"/>
+          <p:cNvPicPr>
+            <a:picLocks noChangeAspect="1"/>
+          </p:cNvPicPr>
+          <p:nvPr/>
+        </p:nvPicPr>
+        <p:blipFill>
+          <a:blip r:embed="rId6"/>
+          <a:stretch>
+            <a:fillRect/>
+          </a:stretch>
+        </p:blipFill>
+        <p:spPr>
+          <a:xfrm>
+            <a:off x="6321772" y="2673956"/>
+            <a:ext cx="4863652" cy="4009917"/>
+          </a:xfrm>
+          <a:prstGeom prst="rect">
+            <a:avLst/>
+          </a:prstGeom>
+        </p:spPr>
+      </p:pic>
+      <p:pic>
+        <p:nvPicPr>
+          <p:cNvPr id="21" name="Picture 20"/>
+          <p:cNvPicPr>
+            <a:picLocks noChangeAspect="1"/>
+          </p:cNvPicPr>
+          <p:nvPr/>
+        </p:nvPicPr>
+        <p:blipFill>
+          <a:blip r:embed="rId7"/>
+          <a:stretch>
+            <a:fillRect/>
+          </a:stretch>
+        </p:blipFill>
+        <p:spPr>
+          <a:xfrm>
+            <a:off x="5797769" y="1447270"/>
+            <a:ext cx="2441587" cy="811408"/>
+          </a:xfrm>
+          <a:prstGeom prst="roundRect">
+            <a:avLst>
+              <a:gd name="adj" fmla="val 8594"/>
+            </a:avLst>
+          </a:prstGeom>
+          <a:solidFill>
+            <a:srgbClr val="FFFFFF">
+              <a:shade val="85000"/>
+            </a:srgbClr>
+          </a:solidFill>
+          <a:ln>
+            <a:noFill/>
+          </a:ln>
+          <a:effectLst>
+            <a:reflection blurRad="12700" stA="0" endPos="0" dist="5000" dir="5400000" sy="-100000" algn="bl" rotWithShape="0"/>
+          </a:effectLst>
+        </p:spPr>
+      </p:pic>
     </p:spTree>
     <p:extLst>
       <p:ext uri="{BB962C8B-B14F-4D97-AF65-F5344CB8AC3E}">
@@ -4022,12 +4981,29 @@
   <p:clrMapOvr>
     <a:masterClrMapping/>
   </p:clrMapOvr>
+  <p:timing>
+    <p:tnLst>
+      <p:par>
+        <p:cTn id="1" dur="indefinite" restart="never" nodeType="tmRoot"/>
+      </p:par>
+    </p:tnLst>
+  </p:timing>
 </p:sld>
 </file>
 
 <file path=ppt/slides/slide6.xml><?xml version="1.0" encoding="utf-8"?>
 <p:sld xmlns:a="http://schemas.openxmlformats.org/drawingml/2006/main" xmlns:r="http://schemas.openxmlformats.org/officeDocument/2006/relationships" xmlns:p="http://schemas.openxmlformats.org/presentationml/2006/main">
   <p:cSld>
+    <p:bg>
+      <p:bgPr>
+        <a:solidFill>
+          <a:schemeClr val="bg1">
+            <a:lumMod val="95000"/>
+          </a:schemeClr>
+        </a:solidFill>
+        <a:effectLst/>
+      </p:bgPr>
+    </p:bg>
     <p:spTree>
       <p:nvGrpSpPr>
         <p:cNvPr id="1" name=""/>
@@ -4052,96 +5028,28 @@
             <p:ph type="title"/>
           </p:nvPr>
         </p:nvSpPr>
-        <p:spPr/>
+        <p:spPr>
+          <a:xfrm>
+            <a:off x="4094018" y="344343"/>
+            <a:ext cx="3872345" cy="1325563"/>
+          </a:xfrm>
+        </p:spPr>
         <p:txBody>
           <a:bodyPr/>
           <a:lstStyle/>
           <a:p>
             <a:pPr algn="ctr"/>
             <a:r>
-              <a:rPr lang="en-US" b="1" dirty="0" smtClean="0"/>
+              <a:rPr lang="en-US" sz="3500" b="1" i="1" spc="600" dirty="0" smtClean="0">
+                <a:latin typeface="Times New Roman" panose="02020603050405020304" pitchFamily="18" charset="0"/>
+                <a:cs typeface="Times New Roman" panose="02020603050405020304" pitchFamily="18" charset="0"/>
+              </a:rPr>
               <a:t>Conclusion</a:t>
             </a:r>
-            <a:endParaRPr lang="en-US" b="1" dirty="0"/>
-          </a:p>
-        </p:txBody>
-      </p:sp>
-      <p:pic>
-        <p:nvPicPr>
-          <p:cNvPr id="5" name="Content Placeholder 4"/>
-          <p:cNvPicPr>
-            <a:picLocks noGrp="1" noChangeAspect="1"/>
-          </p:cNvPicPr>
-          <p:nvPr>
-            <p:ph idx="1"/>
-          </p:nvPr>
-        </p:nvPicPr>
-        <p:blipFill>
-          <a:blip r:embed="rId2">
-            <a:extLst>
-              <a:ext uri="{28A0092B-C50C-407E-A947-70E740481C1C}">
-                <a14:useLocalDpi xmlns:a14="http://schemas.microsoft.com/office/drawing/2010/main" val="0"/>
-              </a:ext>
-            </a:extLst>
-          </a:blip>
-          <a:stretch>
-            <a:fillRect/>
-          </a:stretch>
-        </p:blipFill>
-        <p:spPr>
-          <a:xfrm>
-            <a:off x="1188721" y="1825625"/>
-            <a:ext cx="6361610" cy="4351338"/>
-          </a:xfrm>
-        </p:spPr>
-      </p:pic>
-      <p:sp>
-        <p:nvSpPr>
-          <p:cNvPr id="6" name="Title 1"/>
-          <p:cNvSpPr txBox="1">
-            <a:spLocks/>
-          </p:cNvSpPr>
-          <p:nvPr/>
-        </p:nvSpPr>
-        <p:spPr>
-          <a:xfrm>
-            <a:off x="7550330" y="1825625"/>
-            <a:ext cx="3955869" cy="4351338"/>
-          </a:xfrm>
-          <a:prstGeom prst="rect">
-            <a:avLst/>
-          </a:prstGeom>
-        </p:spPr>
-        <p:txBody>
-          <a:bodyPr vert="horz" lIns="91440" tIns="45720" rIns="91440" bIns="45720" rtlCol="0" anchor="ctr">
-            <a:normAutofit/>
-          </a:bodyPr>
-          <a:lstStyle>
-            <a:lvl1pPr algn="l" defTabSz="914400" rtl="0" eaLnBrk="1" latinLnBrk="0" hangingPunct="1">
-              <a:lnSpc>
-                <a:spcPct val="90000"/>
-              </a:lnSpc>
-              <a:spcBef>
-                <a:spcPct val="0"/>
-              </a:spcBef>
-              <a:buNone/>
-              <a:defRPr sz="4400" kern="1200">
-                <a:solidFill>
-                  <a:schemeClr val="tx1"/>
-                </a:solidFill>
-                <a:latin typeface="+mj-lt"/>
-                <a:ea typeface="+mj-ea"/>
-                <a:cs typeface="+mj-cs"/>
-              </a:defRPr>
-            </a:lvl1pPr>
-          </a:lstStyle>
-          <a:p>
-            <a:pPr algn="ctr"/>
-            <a:r>
-              <a:rPr lang="en-US" sz="2800" b="1" dirty="0" smtClean="0"/>
-              <a:t>Write here</a:t>
-            </a:r>
-            <a:endParaRPr lang="en-US" sz="2800" b="1" dirty="0"/>
+            <a:endParaRPr lang="en-US" sz="3500" b="1" i="1" spc="600" dirty="0">
+              <a:latin typeface="Times New Roman" panose="02020603050405020304" pitchFamily="18" charset="0"/>
+              <a:cs typeface="Times New Roman" panose="02020603050405020304" pitchFamily="18" charset="0"/>
+            </a:endParaRPr>
           </a:p>
         </p:txBody>
       </p:sp>
@@ -4155,6 +5063,13 @@
   <p:clrMapOvr>
     <a:masterClrMapping/>
   </p:clrMapOvr>
+  <p:timing>
+    <p:tnLst>
+      <p:par>
+        <p:cTn id="1" dur="indefinite" restart="never" nodeType="tmRoot"/>
+      </p:par>
+    </p:tnLst>
+  </p:timing>
 </p:sld>
 </file>
 

</xml_diff>